<commit_message>
Update Bubble issue Jan 2024 mux.pptx
</commit_message>
<xml_diff>
--- a/Presentation/Bubble issue Jan 2024 mux.pptx
+++ b/Presentation/Bubble issue Jan 2024 mux.pptx
@@ -4235,7 +4235,7 @@
           <a:p>
             <a:fld id="{0F939D3D-C052-447F-AF72-803AA7F2A4AB}" type="datetimeFigureOut">
               <a:rPr lang="en-US" smtClean="0"/>
-              <a:t>3/21/2025</a:t>
+              <a:t>5/21/2025</a:t>
             </a:fld>
             <a:endParaRPr lang="en-US"/>
           </a:p>
@@ -4433,7 +4433,7 @@
           <a:p>
             <a:fld id="{0F939D3D-C052-447F-AF72-803AA7F2A4AB}" type="datetimeFigureOut">
               <a:rPr lang="en-US" smtClean="0"/>
-              <a:t>3/21/2025</a:t>
+              <a:t>5/21/2025</a:t>
             </a:fld>
             <a:endParaRPr lang="en-US"/>
           </a:p>
@@ -4641,7 +4641,7 @@
           <a:p>
             <a:fld id="{0F939D3D-C052-447F-AF72-803AA7F2A4AB}" type="datetimeFigureOut">
               <a:rPr lang="en-US" smtClean="0"/>
-              <a:t>3/21/2025</a:t>
+              <a:t>5/21/2025</a:t>
             </a:fld>
             <a:endParaRPr lang="en-US"/>
           </a:p>
@@ -4839,7 +4839,7 @@
           <a:p>
             <a:fld id="{0F939D3D-C052-447F-AF72-803AA7F2A4AB}" type="datetimeFigureOut">
               <a:rPr lang="en-US" smtClean="0"/>
-              <a:t>3/21/2025</a:t>
+              <a:t>5/21/2025</a:t>
             </a:fld>
             <a:endParaRPr lang="en-US"/>
           </a:p>
@@ -5114,7 +5114,7 @@
           <a:p>
             <a:fld id="{0F939D3D-C052-447F-AF72-803AA7F2A4AB}" type="datetimeFigureOut">
               <a:rPr lang="en-US" smtClean="0"/>
-              <a:t>3/21/2025</a:t>
+              <a:t>5/21/2025</a:t>
             </a:fld>
             <a:endParaRPr lang="en-US"/>
           </a:p>
@@ -5379,7 +5379,7 @@
           <a:p>
             <a:fld id="{0F939D3D-C052-447F-AF72-803AA7F2A4AB}" type="datetimeFigureOut">
               <a:rPr lang="en-US" smtClean="0"/>
-              <a:t>3/21/2025</a:t>
+              <a:t>5/21/2025</a:t>
             </a:fld>
             <a:endParaRPr lang="en-US"/>
           </a:p>
@@ -5791,7 +5791,7 @@
           <a:p>
             <a:fld id="{0F939D3D-C052-447F-AF72-803AA7F2A4AB}" type="datetimeFigureOut">
               <a:rPr lang="en-US" smtClean="0"/>
-              <a:t>3/21/2025</a:t>
+              <a:t>5/21/2025</a:t>
             </a:fld>
             <a:endParaRPr lang="en-US"/>
           </a:p>
@@ -5932,7 +5932,7 @@
           <a:p>
             <a:fld id="{0F939D3D-C052-447F-AF72-803AA7F2A4AB}" type="datetimeFigureOut">
               <a:rPr lang="en-US" smtClean="0"/>
-              <a:t>3/21/2025</a:t>
+              <a:t>5/21/2025</a:t>
             </a:fld>
             <a:endParaRPr lang="en-US"/>
           </a:p>
@@ -6045,7 +6045,7 @@
           <a:p>
             <a:fld id="{0F939D3D-C052-447F-AF72-803AA7F2A4AB}" type="datetimeFigureOut">
               <a:rPr lang="en-US" smtClean="0"/>
-              <a:t>3/21/2025</a:t>
+              <a:t>5/21/2025</a:t>
             </a:fld>
             <a:endParaRPr lang="en-US"/>
           </a:p>
@@ -6356,7 +6356,7 @@
           <a:p>
             <a:fld id="{0F939D3D-C052-447F-AF72-803AA7F2A4AB}" type="datetimeFigureOut">
               <a:rPr lang="en-US" smtClean="0"/>
-              <a:t>3/21/2025</a:t>
+              <a:t>5/21/2025</a:t>
             </a:fld>
             <a:endParaRPr lang="en-US"/>
           </a:p>
@@ -6644,7 +6644,7 @@
           <a:p>
             <a:fld id="{0F939D3D-C052-447F-AF72-803AA7F2A4AB}" type="datetimeFigureOut">
               <a:rPr lang="en-US" smtClean="0"/>
-              <a:t>3/21/2025</a:t>
+              <a:t>5/21/2025</a:t>
             </a:fld>
             <a:endParaRPr lang="en-US"/>
           </a:p>
@@ -6885,7 +6885,7 @@
           <a:p>
             <a:fld id="{0F939D3D-C052-447F-AF72-803AA7F2A4AB}" type="datetimeFigureOut">
               <a:rPr lang="en-US" smtClean="0"/>
-              <a:t>3/21/2025</a:t>
+              <a:t>5/21/2025</a:t>
             </a:fld>
             <a:endParaRPr lang="en-US"/>
           </a:p>
@@ -7924,6 +7924,99 @@
           </a:p>
         </p:txBody>
       </p:sp>
+      <p:sp>
+        <p:nvSpPr>
+          <p:cNvPr id="2" name="TextBox 1">
+            <a:extLst>
+              <a:ext uri="{FF2B5EF4-FFF2-40B4-BE49-F238E27FC236}">
+                <a16:creationId xmlns:a16="http://schemas.microsoft.com/office/drawing/2014/main" id="{9318662C-26DF-A5EB-5113-118DC4CFF373}"/>
+              </a:ext>
+            </a:extLst>
+          </p:cNvPr>
+          <p:cNvSpPr txBox="1"/>
+          <p:nvPr/>
+        </p:nvSpPr>
+        <p:spPr>
+          <a:xfrm>
+            <a:off x="3506389" y="3028040"/>
+            <a:ext cx="929935" cy="646331"/>
+          </a:xfrm>
+          <a:prstGeom prst="rect">
+            <a:avLst/>
+          </a:prstGeom>
+          <a:solidFill>
+            <a:schemeClr val="bg1"/>
+          </a:solidFill>
+          <a:ln w="25400">
+            <a:solidFill>
+              <a:srgbClr val="FF0000"/>
+            </a:solidFill>
+          </a:ln>
+        </p:spPr>
+        <p:txBody>
+          <a:bodyPr wrap="square" rtlCol="0">
+            <a:spAutoFit/>
+          </a:bodyPr>
+          <a:lstStyle/>
+          <a:p>
+            <a:r>
+              <a:rPr lang="en-US" dirty="0"/>
+              <a:t>Turn on</a:t>
+            </a:r>
+          </a:p>
+          <a:p>
+            <a:r>
+              <a:rPr lang="en-US" dirty="0"/>
+              <a:t>OB1</a:t>
+            </a:r>
+          </a:p>
+        </p:txBody>
+      </p:sp>
+      <p:cxnSp>
+        <p:nvCxnSpPr>
+          <p:cNvPr id="3" name="Straight Arrow Connector 2">
+            <a:extLst>
+              <a:ext uri="{FF2B5EF4-FFF2-40B4-BE49-F238E27FC236}">
+                <a16:creationId xmlns:a16="http://schemas.microsoft.com/office/drawing/2014/main" id="{8DC2CFF0-0490-A63F-7761-4F3F36C7C782}"/>
+              </a:ext>
+            </a:extLst>
+          </p:cNvPr>
+          <p:cNvCxnSpPr>
+            <a:cxnSpLocks/>
+            <a:stCxn id="2" idx="2"/>
+          </p:cNvCxnSpPr>
+          <p:nvPr/>
+        </p:nvCxnSpPr>
+        <p:spPr>
+          <a:xfrm flipH="1">
+            <a:off x="3279531" y="3674371"/>
+            <a:ext cx="691826" cy="1499902"/>
+          </a:xfrm>
+          <a:prstGeom prst="straightConnector1">
+            <a:avLst/>
+          </a:prstGeom>
+          <a:ln w="25400">
+            <a:solidFill>
+              <a:srgbClr val="FF0000"/>
+            </a:solidFill>
+            <a:tailEnd type="triangle"/>
+          </a:ln>
+        </p:spPr>
+        <p:style>
+          <a:lnRef idx="2">
+            <a:schemeClr val="accent1"/>
+          </a:lnRef>
+          <a:fillRef idx="0">
+            <a:schemeClr val="accent1"/>
+          </a:fillRef>
+          <a:effectRef idx="1">
+            <a:schemeClr val="accent1"/>
+          </a:effectRef>
+          <a:fontRef idx="minor">
+            <a:schemeClr val="tx1"/>
+          </a:fontRef>
+        </p:style>
+      </p:cxnSp>
     </p:spTree>
     <p:extLst>
       <p:ext uri="{BB962C8B-B14F-4D97-AF65-F5344CB8AC3E}">

</xml_diff>